<commit_message>
Uploading a sample project from 2014
The requirements each year differ so refer to this year’s instructions
not the sample when you work on your project.
</commit_message>
<xml_diff>
--- a/slides/Week 4/Evaluation Blog Post comments.pptx
+++ b/slides/Week 4/Evaluation Blog Post comments.pptx
@@ -3468,7 +3468,26 @@
       </p:grpSpPr>
       <p:sp>
         <p:nvSpPr>
-          <p:cNvPr id="2" name="Title 1"/>
+          <p:cNvPr id="6" name="Content Placeholder 5"/>
+          <p:cNvSpPr>
+            <a:spLocks noGrp="1"/>
+          </p:cNvSpPr>
+          <p:nvPr>
+            <p:ph idx="1"/>
+          </p:nvPr>
+        </p:nvSpPr>
+        <p:spPr/>
+        <p:txBody>
+          <a:bodyPr/>
+          <a:lstStyle/>
+          <a:p>
+            <a:endParaRPr lang="en-US"/>
+          </a:p>
+        </p:txBody>
+      </p:sp>
+      <p:sp>
+        <p:nvSpPr>
+          <p:cNvPr id="7" name="Title 6"/>
           <p:cNvSpPr>
             <a:spLocks noGrp="1"/>
           </p:cNvSpPr>
@@ -3481,48 +3500,34 @@
           <a:bodyPr/>
           <a:lstStyle/>
           <a:p>
-            <a:r>
-              <a:rPr lang="en-US" dirty="0" smtClean="0"/>
-              <a:t>See </a:t>
-            </a:r>
-            <a:r>
-              <a:rPr lang="en-US" dirty="0" err="1" smtClean="0"/>
-              <a:t>mindmap</a:t>
-            </a:r>
-            <a:r>
-              <a:rPr lang="en-US" dirty="0" smtClean="0"/>
-              <a:t> in the first few posts</a:t>
-            </a:r>
-            <a:endParaRPr lang="en-US" dirty="0"/>
-          </a:p>
-        </p:txBody>
-      </p:sp>
-      <p:sp>
-        <p:nvSpPr>
-          <p:cNvPr id="3" name="Content Placeholder 2"/>
-          <p:cNvSpPr>
-            <a:spLocks noGrp="1"/>
-          </p:cNvSpPr>
-          <p:nvPr>
-            <p:ph idx="1"/>
-          </p:nvPr>
-        </p:nvSpPr>
-        <p:spPr/>
-        <p:txBody>
-          <a:bodyPr/>
-          <a:lstStyle/>
-          <a:p>
-            <a:pPr marL="0" indent="0">
-              <a:buNone/>
-            </a:pPr>
-            <a:r>
-              <a:rPr lang="en-US" dirty="0" smtClean="0"/>
-              <a:t>(couldn’t download here, will add later)</a:t>
-            </a:r>
-            <a:endParaRPr lang="en-US" dirty="0"/>
-          </a:p>
-        </p:txBody>
-      </p:sp>
+            <a:endParaRPr lang="en-US"/>
+          </a:p>
+        </p:txBody>
+      </p:sp>
+      <p:pic>
+        <p:nvPicPr>
+          <p:cNvPr id="8" name="Picture 7"/>
+          <p:cNvPicPr>
+            <a:picLocks noChangeAspect="1"/>
+          </p:cNvPicPr>
+          <p:nvPr/>
+        </p:nvPicPr>
+        <p:blipFill>
+          <a:blip r:embed="rId2"/>
+          <a:stretch>
+            <a:fillRect/>
+          </a:stretch>
+        </p:blipFill>
+        <p:spPr>
+          <a:xfrm>
+            <a:off x="517524" y="347661"/>
+            <a:ext cx="10836275" cy="6620175"/>
+          </a:xfrm>
+          <a:prstGeom prst="rect">
+            <a:avLst/>
+          </a:prstGeom>
+        </p:spPr>
+      </p:pic>
     </p:spTree>
     <p:extLst>
       <p:ext uri="{BB962C8B-B14F-4D97-AF65-F5344CB8AC3E}">

</xml_diff>